<commit_message>
and the PDO is now done.
time to push these .hecc files made in the PDO and a slight edit I made to the PDO. Then I'll have to merge this into master I guess
</commit_message>
<xml_diff>
--- a/Reports n such/PDO presentation.pptx
+++ b/Reports n such/PDO presentation.pptx
@@ -146,7 +146,7 @@
 <file path=ppt/revisionInfo.xml><?xml version="1.0" encoding="utf-8"?>
 <p1510:revInfo xmlns:a="http://schemas.openxmlformats.org/drawingml/2006/main" xmlns:r="http://schemas.openxmlformats.org/officeDocument/2006/relationships" xmlns:p1510="http://schemas.microsoft.com/office/powerpoint/2015/10/main">
   <p1510:revLst>
-    <p1510:client id="{3A09807C-0A35-43B8-9B58-B1294ABA1295}" v="6967" dt="2021-05-12T13:17:48.352"/>
+    <p1510:client id="{3A09807C-0A35-43B8-9B58-B1294ABA1295}" v="6968" dt="2021-05-12T15:48:23.137"/>
   </p1510:revLst>
 </p1510:revInfo>
 </file>
@@ -8872,7 +8872,7 @@
           <a:bodyPr/>
           <a:lstStyle/>
           <a:p>
-            <a:fld id="{EFADF8B9-0282-4439-84B0-AC6848C9FC53}" type="datetimeFigureOut">
+            <a:fld id="{854A0C49-5D98-4030-92B6-DEEF33393558}" type="datetime1">
               <a:rPr lang="en-GB" smtClean="0"/>
               <a:t>12/05/2021</a:t>
             </a:fld>
@@ -9042,7 +9042,7 @@
           <a:bodyPr/>
           <a:lstStyle/>
           <a:p>
-            <a:fld id="{EFADF8B9-0282-4439-84B0-AC6848C9FC53}" type="datetimeFigureOut">
+            <a:fld id="{33860AD5-15A8-4E3F-AAC0-407356EE0B3F}" type="datetime1">
               <a:rPr lang="en-GB" smtClean="0"/>
               <a:t>12/05/2021</a:t>
             </a:fld>
@@ -9222,7 +9222,7 @@
           <a:bodyPr/>
           <a:lstStyle/>
           <a:p>
-            <a:fld id="{EFADF8B9-0282-4439-84B0-AC6848C9FC53}" type="datetimeFigureOut">
+            <a:fld id="{FA415F42-1E12-4458-9C4B-1645D5087A24}" type="datetime1">
               <a:rPr lang="en-GB" smtClean="0"/>
               <a:t>12/05/2021</a:t>
             </a:fld>
@@ -9392,7 +9392,7 @@
           <a:bodyPr/>
           <a:lstStyle/>
           <a:p>
-            <a:fld id="{EFADF8B9-0282-4439-84B0-AC6848C9FC53}" type="datetimeFigureOut">
+            <a:fld id="{E3286AE1-E61F-4E3E-85E0-24ED101DD5AA}" type="datetime1">
               <a:rPr lang="en-GB" smtClean="0"/>
               <a:t>12/05/2021</a:t>
             </a:fld>
@@ -9638,7 +9638,7 @@
           <a:bodyPr/>
           <a:lstStyle/>
           <a:p>
-            <a:fld id="{EFADF8B9-0282-4439-84B0-AC6848C9FC53}" type="datetimeFigureOut">
+            <a:fld id="{FD28560E-8FDE-4FF2-930F-3E0F59E9E007}" type="datetime1">
               <a:rPr lang="en-GB" smtClean="0"/>
               <a:t>12/05/2021</a:t>
             </a:fld>
@@ -9870,7 +9870,7 @@
           <a:bodyPr/>
           <a:lstStyle/>
           <a:p>
-            <a:fld id="{EFADF8B9-0282-4439-84B0-AC6848C9FC53}" type="datetimeFigureOut">
+            <a:fld id="{DFCAE488-6DC4-4CF7-8AFD-A5DEC2CFEDCA}" type="datetime1">
               <a:rPr lang="en-GB" smtClean="0"/>
               <a:t>12/05/2021</a:t>
             </a:fld>
@@ -10237,7 +10237,7 @@
           <a:bodyPr/>
           <a:lstStyle/>
           <a:p>
-            <a:fld id="{EFADF8B9-0282-4439-84B0-AC6848C9FC53}" type="datetimeFigureOut">
+            <a:fld id="{8DEE4473-537C-42B8-9F06-5E586F7D9394}" type="datetime1">
               <a:rPr lang="en-GB" smtClean="0"/>
               <a:t>12/05/2021</a:t>
             </a:fld>
@@ -10355,7 +10355,7 @@
           <a:bodyPr/>
           <a:lstStyle/>
           <a:p>
-            <a:fld id="{EFADF8B9-0282-4439-84B0-AC6848C9FC53}" type="datetimeFigureOut">
+            <a:fld id="{7BB52592-5213-44EB-BEF9-2DEEA1DA2574}" type="datetime1">
               <a:rPr lang="en-GB" smtClean="0"/>
               <a:t>12/05/2021</a:t>
             </a:fld>
@@ -10450,7 +10450,7 @@
           <a:bodyPr/>
           <a:lstStyle/>
           <a:p>
-            <a:fld id="{EFADF8B9-0282-4439-84B0-AC6848C9FC53}" type="datetimeFigureOut">
+            <a:fld id="{343FD3DF-FFDC-42C1-BA94-6C9A55096188}" type="datetime1">
               <a:rPr lang="en-GB" smtClean="0"/>
               <a:t>12/05/2021</a:t>
             </a:fld>
@@ -10727,7 +10727,7 @@
           <a:bodyPr/>
           <a:lstStyle/>
           <a:p>
-            <a:fld id="{EFADF8B9-0282-4439-84B0-AC6848C9FC53}" type="datetimeFigureOut">
+            <a:fld id="{2ABB6C17-6394-487A-AB29-05DDC11373A3}" type="datetime1">
               <a:rPr lang="en-GB" smtClean="0"/>
               <a:t>12/05/2021</a:t>
             </a:fld>
@@ -10984,7 +10984,7 @@
           <a:bodyPr/>
           <a:lstStyle/>
           <a:p>
-            <a:fld id="{EFADF8B9-0282-4439-84B0-AC6848C9FC53}" type="datetimeFigureOut">
+            <a:fld id="{7A331706-BB0F-46FD-BFEA-B43308A86C55}" type="datetime1">
               <a:rPr lang="en-GB" smtClean="0"/>
               <a:t>12/05/2021</a:t>
             </a:fld>
@@ -11197,7 +11197,7 @@
             </a:lvl1pPr>
           </a:lstStyle>
           <a:p>
-            <a:fld id="{EFADF8B9-0282-4439-84B0-AC6848C9FC53}" type="datetimeFigureOut">
+            <a:fld id="{112B8766-51AF-4BC1-BF53-97452C7EAC50}" type="datetime1">
               <a:rPr lang="en-GB" smtClean="0"/>
               <a:t>12/05/2021</a:t>
             </a:fld>
@@ -11304,6 +11304,7 @@
     <p:sldLayoutId id="2147483766" r:id="rId10"/>
     <p:sldLayoutId id="2147483767" r:id="rId11"/>
   </p:sldLayoutIdLst>
+  <p:hf hdr="0" ftr="0" dt="0"/>
   <p:txStyles>
     <p:titleStyle>
       <a:lvl1pPr algn="l" defTabSz="914400" rtl="0" eaLnBrk="1" latinLnBrk="0" hangingPunct="1">
@@ -11695,6 +11696,35 @@
           </a:p>
           <a:p>
             <a:endParaRPr lang="en-GB" dirty="0"/>
+          </a:p>
+        </p:txBody>
+      </p:sp>
+      <p:sp>
+        <p:nvSpPr>
+          <p:cNvPr id="4" name="Slide Number Placeholder 3">
+            <a:extLst>
+              <a:ext uri="{FF2B5EF4-FFF2-40B4-BE49-F238E27FC236}">
+                <a16:creationId xmlns:a16="http://schemas.microsoft.com/office/drawing/2014/main" id="{5105E1DB-C3C0-4A01-9E1A-9CD4535599D2}"/>
+              </a:ext>
+            </a:extLst>
+          </p:cNvPr>
+          <p:cNvSpPr>
+            <a:spLocks noGrp="1"/>
+          </p:cNvSpPr>
+          <p:nvPr>
+            <p:ph type="sldNum" sz="quarter" idx="12"/>
+          </p:nvPr>
+        </p:nvSpPr>
+        <p:spPr/>
+        <p:txBody>
+          <a:bodyPr/>
+          <a:lstStyle/>
+          <a:p>
+            <a:fld id="{558F8992-8396-4A3F-A09F-D0B391125C2B}" type="slidenum">
+              <a:rPr lang="en-GB" smtClean="0"/>
+              <a:t>1</a:t>
+            </a:fld>
+            <a:endParaRPr lang="en-GB"/>
           </a:p>
         </p:txBody>
       </p:sp>
@@ -12247,6 +12277,35 @@
               <a:rPr lang="en-GB" dirty="0"/>
               <a:t>’ methods to produce .hecc code</a:t>
             </a:r>
+          </a:p>
+        </p:txBody>
+      </p:sp>
+      <p:sp>
+        <p:nvSpPr>
+          <p:cNvPr id="7" name="Slide Number Placeholder 6">
+            <a:extLst>
+              <a:ext uri="{FF2B5EF4-FFF2-40B4-BE49-F238E27FC236}">
+                <a16:creationId xmlns:a16="http://schemas.microsoft.com/office/drawing/2014/main" id="{EB35A591-A7B9-45D1-9613-BB02B49A50F3}"/>
+              </a:ext>
+            </a:extLst>
+          </p:cNvPr>
+          <p:cNvSpPr>
+            <a:spLocks noGrp="1"/>
+          </p:cNvSpPr>
+          <p:nvPr>
+            <p:ph type="sldNum" sz="quarter" idx="12"/>
+          </p:nvPr>
+        </p:nvSpPr>
+        <p:spPr/>
+        <p:txBody>
+          <a:bodyPr/>
+          <a:lstStyle/>
+          <a:p>
+            <a:fld id="{558F8992-8396-4A3F-A09F-D0B391125C2B}" type="slidenum">
+              <a:rPr lang="en-GB" smtClean="0"/>
+              <a:t>10</a:t>
+            </a:fld>
+            <a:endParaRPr lang="en-GB"/>
           </a:p>
         </p:txBody>
       </p:sp>
@@ -13228,6 +13287,35 @@
           </a:p>
         </p:txBody>
       </p:sp>
+      <p:sp>
+        <p:nvSpPr>
+          <p:cNvPr id="3" name="Slide Number Placeholder 2">
+            <a:extLst>
+              <a:ext uri="{FF2B5EF4-FFF2-40B4-BE49-F238E27FC236}">
+                <a16:creationId xmlns:a16="http://schemas.microsoft.com/office/drawing/2014/main" id="{5F5D0DAB-BAAE-4716-9E89-48A14568ED52}"/>
+              </a:ext>
+            </a:extLst>
+          </p:cNvPr>
+          <p:cNvSpPr>
+            <a:spLocks noGrp="1"/>
+          </p:cNvSpPr>
+          <p:nvPr>
+            <p:ph type="sldNum" sz="quarter" idx="12"/>
+          </p:nvPr>
+        </p:nvSpPr>
+        <p:spPr/>
+        <p:txBody>
+          <a:bodyPr/>
+          <a:lstStyle/>
+          <a:p>
+            <a:fld id="{558F8992-8396-4A3F-A09F-D0B391125C2B}" type="slidenum">
+              <a:rPr lang="en-GB" smtClean="0"/>
+              <a:t>11</a:t>
+            </a:fld>
+            <a:endParaRPr lang="en-GB"/>
+          </a:p>
+        </p:txBody>
+      </p:sp>
     </p:spTree>
     <p:extLst>
       <p:ext uri="{BB962C8B-B14F-4D97-AF65-F5344CB8AC3E}">
@@ -14036,6 +14124,35 @@
           </a:p>
         </p:txBody>
       </p:sp>
+      <p:sp>
+        <p:nvSpPr>
+          <p:cNvPr id="4" name="Slide Number Placeholder 3">
+            <a:extLst>
+              <a:ext uri="{FF2B5EF4-FFF2-40B4-BE49-F238E27FC236}">
+                <a16:creationId xmlns:a16="http://schemas.microsoft.com/office/drawing/2014/main" id="{B1EA85BD-EB18-445B-B22E-9D69725610E5}"/>
+              </a:ext>
+            </a:extLst>
+          </p:cNvPr>
+          <p:cNvSpPr>
+            <a:spLocks noGrp="1"/>
+          </p:cNvSpPr>
+          <p:nvPr>
+            <p:ph type="sldNum" sz="quarter" idx="12"/>
+          </p:nvPr>
+        </p:nvSpPr>
+        <p:spPr/>
+        <p:txBody>
+          <a:bodyPr/>
+          <a:lstStyle/>
+          <a:p>
+            <a:fld id="{558F8992-8396-4A3F-A09F-D0B391125C2B}" type="slidenum">
+              <a:rPr lang="en-GB" smtClean="0"/>
+              <a:t>12</a:t>
+            </a:fld>
+            <a:endParaRPr lang="en-GB"/>
+          </a:p>
+        </p:txBody>
+      </p:sp>
     </p:spTree>
     <p:extLst>
       <p:ext uri="{BB962C8B-B14F-4D97-AF65-F5344CB8AC3E}">
@@ -14333,6 +14450,35 @@
           </a:p>
           <a:p>
             <a:endParaRPr lang="en-GB" dirty="0"/>
+          </a:p>
+        </p:txBody>
+      </p:sp>
+      <p:sp>
+        <p:nvSpPr>
+          <p:cNvPr id="4" name="Slide Number Placeholder 3">
+            <a:extLst>
+              <a:ext uri="{FF2B5EF4-FFF2-40B4-BE49-F238E27FC236}">
+                <a16:creationId xmlns:a16="http://schemas.microsoft.com/office/drawing/2014/main" id="{06CE7703-647F-45D1-8E30-F005F120050F}"/>
+              </a:ext>
+            </a:extLst>
+          </p:cNvPr>
+          <p:cNvSpPr>
+            <a:spLocks noGrp="1"/>
+          </p:cNvSpPr>
+          <p:nvPr>
+            <p:ph type="sldNum" sz="quarter" idx="12"/>
+          </p:nvPr>
+        </p:nvSpPr>
+        <p:spPr/>
+        <p:txBody>
+          <a:bodyPr/>
+          <a:lstStyle/>
+          <a:p>
+            <a:fld id="{558F8992-8396-4A3F-A09F-D0B391125C2B}" type="slidenum">
+              <a:rPr lang="en-GB" smtClean="0"/>
+              <a:t>13</a:t>
+            </a:fld>
+            <a:endParaRPr lang="en-GB"/>
           </a:p>
         </p:txBody>
       </p:sp>
@@ -15044,6 +15190,35 @@
           </a:p>
         </p:txBody>
       </p:sp>
+      <p:sp>
+        <p:nvSpPr>
+          <p:cNvPr id="4" name="Slide Number Placeholder 3">
+            <a:extLst>
+              <a:ext uri="{FF2B5EF4-FFF2-40B4-BE49-F238E27FC236}">
+                <a16:creationId xmlns:a16="http://schemas.microsoft.com/office/drawing/2014/main" id="{61AB546D-EA71-4C0B-83C2-F8AD950953ED}"/>
+              </a:ext>
+            </a:extLst>
+          </p:cNvPr>
+          <p:cNvSpPr>
+            <a:spLocks noGrp="1"/>
+          </p:cNvSpPr>
+          <p:nvPr>
+            <p:ph type="sldNum" sz="quarter" idx="12"/>
+          </p:nvPr>
+        </p:nvSpPr>
+        <p:spPr/>
+        <p:txBody>
+          <a:bodyPr/>
+          <a:lstStyle/>
+          <a:p>
+            <a:fld id="{558F8992-8396-4A3F-A09F-D0B391125C2B}" type="slidenum">
+              <a:rPr lang="en-GB" smtClean="0"/>
+              <a:t>14</a:t>
+            </a:fld>
+            <a:endParaRPr lang="en-GB"/>
+          </a:p>
+        </p:txBody>
+      </p:sp>
     </p:spTree>
     <p:extLst>
       <p:ext uri="{BB962C8B-B14F-4D97-AF65-F5344CB8AC3E}">
@@ -15559,6 +15734,35 @@
           </a:xfrm>
         </p:spPr>
       </p:pic>
+      <p:sp>
+        <p:nvSpPr>
+          <p:cNvPr id="3" name="Slide Number Placeholder 2">
+            <a:extLst>
+              <a:ext uri="{FF2B5EF4-FFF2-40B4-BE49-F238E27FC236}">
+                <a16:creationId xmlns:a16="http://schemas.microsoft.com/office/drawing/2014/main" id="{A4F45DD5-7335-4713-8F2A-ABE8603F4A24}"/>
+              </a:ext>
+            </a:extLst>
+          </p:cNvPr>
+          <p:cNvSpPr>
+            <a:spLocks noGrp="1"/>
+          </p:cNvSpPr>
+          <p:nvPr>
+            <p:ph type="sldNum" sz="quarter" idx="12"/>
+          </p:nvPr>
+        </p:nvSpPr>
+        <p:spPr/>
+        <p:txBody>
+          <a:bodyPr/>
+          <a:lstStyle/>
+          <a:p>
+            <a:fld id="{558F8992-8396-4A3F-A09F-D0B391125C2B}" type="slidenum">
+              <a:rPr lang="en-GB" smtClean="0"/>
+              <a:t>15</a:t>
+            </a:fld>
+            <a:endParaRPr lang="en-GB"/>
+          </a:p>
+        </p:txBody>
+      </p:sp>
     </p:spTree>
     <p:extLst>
       <p:ext uri="{BB962C8B-B14F-4D97-AF65-F5344CB8AC3E}">
@@ -15921,6 +16125,35 @@
           </a:p>
           <a:p>
             <a:endParaRPr lang="en-GB" dirty="0"/>
+          </a:p>
+        </p:txBody>
+      </p:sp>
+      <p:sp>
+        <p:nvSpPr>
+          <p:cNvPr id="7" name="Slide Number Placeholder 6">
+            <a:extLst>
+              <a:ext uri="{FF2B5EF4-FFF2-40B4-BE49-F238E27FC236}">
+                <a16:creationId xmlns:a16="http://schemas.microsoft.com/office/drawing/2014/main" id="{D090C3CD-6D76-4BB4-AA8A-73A707439FE9}"/>
+              </a:ext>
+            </a:extLst>
+          </p:cNvPr>
+          <p:cNvSpPr>
+            <a:spLocks noGrp="1"/>
+          </p:cNvSpPr>
+          <p:nvPr>
+            <p:ph type="sldNum" sz="quarter" idx="12"/>
+          </p:nvPr>
+        </p:nvSpPr>
+        <p:spPr/>
+        <p:txBody>
+          <a:bodyPr/>
+          <a:lstStyle/>
+          <a:p>
+            <a:fld id="{558F8992-8396-4A3F-A09F-D0B391125C2B}" type="slidenum">
+              <a:rPr lang="en-GB" smtClean="0"/>
+              <a:t>16</a:t>
+            </a:fld>
+            <a:endParaRPr lang="en-GB"/>
           </a:p>
         </p:txBody>
       </p:sp>
@@ -16873,6 +17106,35 @@
           </a:p>
         </p:txBody>
       </p:sp>
+      <p:sp>
+        <p:nvSpPr>
+          <p:cNvPr id="4" name="Slide Number Placeholder 3">
+            <a:extLst>
+              <a:ext uri="{FF2B5EF4-FFF2-40B4-BE49-F238E27FC236}">
+                <a16:creationId xmlns:a16="http://schemas.microsoft.com/office/drawing/2014/main" id="{4277B7DB-9FF6-441D-A7BE-8EE94A4CADC1}"/>
+              </a:ext>
+            </a:extLst>
+          </p:cNvPr>
+          <p:cNvSpPr>
+            <a:spLocks noGrp="1"/>
+          </p:cNvSpPr>
+          <p:nvPr>
+            <p:ph type="sldNum" sz="quarter" idx="12"/>
+          </p:nvPr>
+        </p:nvSpPr>
+        <p:spPr/>
+        <p:txBody>
+          <a:bodyPr/>
+          <a:lstStyle/>
+          <a:p>
+            <a:fld id="{558F8992-8396-4A3F-A09F-D0B391125C2B}" type="slidenum">
+              <a:rPr lang="en-GB" smtClean="0"/>
+              <a:t>17</a:t>
+            </a:fld>
+            <a:endParaRPr lang="en-GB"/>
+          </a:p>
+        </p:txBody>
+      </p:sp>
     </p:spTree>
     <p:extLst>
       <p:ext uri="{BB962C8B-B14F-4D97-AF65-F5344CB8AC3E}">
@@ -16965,6 +17227,35 @@
           </a:xfrm>
         </p:spPr>
       </p:pic>
+      <p:sp>
+        <p:nvSpPr>
+          <p:cNvPr id="3" name="Slide Number Placeholder 2">
+            <a:extLst>
+              <a:ext uri="{FF2B5EF4-FFF2-40B4-BE49-F238E27FC236}">
+                <a16:creationId xmlns:a16="http://schemas.microsoft.com/office/drawing/2014/main" id="{AA25D1FD-2AD7-4927-8816-A79338CA2A6C}"/>
+              </a:ext>
+            </a:extLst>
+          </p:cNvPr>
+          <p:cNvSpPr>
+            <a:spLocks noGrp="1"/>
+          </p:cNvSpPr>
+          <p:nvPr>
+            <p:ph type="sldNum" sz="quarter" idx="12"/>
+          </p:nvPr>
+        </p:nvSpPr>
+        <p:spPr/>
+        <p:txBody>
+          <a:bodyPr/>
+          <a:lstStyle/>
+          <a:p>
+            <a:fld id="{558F8992-8396-4A3F-A09F-D0B391125C2B}" type="slidenum">
+              <a:rPr lang="en-GB" smtClean="0"/>
+              <a:t>18</a:t>
+            </a:fld>
+            <a:endParaRPr lang="en-GB"/>
+          </a:p>
+        </p:txBody>
+      </p:sp>
     </p:spTree>
     <p:extLst>
       <p:ext uri="{BB962C8B-B14F-4D97-AF65-F5344CB8AC3E}">
@@ -17058,6 +17349,35 @@
           </a:xfrm>
         </p:spPr>
       </p:pic>
+      <p:sp>
+        <p:nvSpPr>
+          <p:cNvPr id="3" name="Slide Number Placeholder 2">
+            <a:extLst>
+              <a:ext uri="{FF2B5EF4-FFF2-40B4-BE49-F238E27FC236}">
+                <a16:creationId xmlns:a16="http://schemas.microsoft.com/office/drawing/2014/main" id="{D8B26C67-563E-4EBA-9D14-FA4A6B02A2B5}"/>
+              </a:ext>
+            </a:extLst>
+          </p:cNvPr>
+          <p:cNvSpPr>
+            <a:spLocks noGrp="1"/>
+          </p:cNvSpPr>
+          <p:nvPr>
+            <p:ph type="sldNum" sz="quarter" idx="12"/>
+          </p:nvPr>
+        </p:nvSpPr>
+        <p:spPr/>
+        <p:txBody>
+          <a:bodyPr/>
+          <a:lstStyle/>
+          <a:p>
+            <a:fld id="{558F8992-8396-4A3F-A09F-D0B391125C2B}" type="slidenum">
+              <a:rPr lang="en-GB" smtClean="0"/>
+              <a:t>19</a:t>
+            </a:fld>
+            <a:endParaRPr lang="en-GB"/>
+          </a:p>
+        </p:txBody>
+      </p:sp>
     </p:spTree>
     <p:extLst>
       <p:ext uri="{BB962C8B-B14F-4D97-AF65-F5344CB8AC3E}">
@@ -17219,6 +17539,35 @@
           </a:p>
           <a:p>
             <a:endParaRPr lang="en-GB" dirty="0"/>
+          </a:p>
+        </p:txBody>
+      </p:sp>
+      <p:sp>
+        <p:nvSpPr>
+          <p:cNvPr id="4" name="Slide Number Placeholder 3">
+            <a:extLst>
+              <a:ext uri="{FF2B5EF4-FFF2-40B4-BE49-F238E27FC236}">
+                <a16:creationId xmlns:a16="http://schemas.microsoft.com/office/drawing/2014/main" id="{6CF193CB-CC38-45E2-BC13-CD8B6DDC818B}"/>
+              </a:ext>
+            </a:extLst>
+          </p:cNvPr>
+          <p:cNvSpPr>
+            <a:spLocks noGrp="1"/>
+          </p:cNvSpPr>
+          <p:nvPr>
+            <p:ph type="sldNum" sz="quarter" idx="12"/>
+          </p:nvPr>
+        </p:nvSpPr>
+        <p:spPr/>
+        <p:txBody>
+          <a:bodyPr/>
+          <a:lstStyle/>
+          <a:p>
+            <a:fld id="{558F8992-8396-4A3F-A09F-D0B391125C2B}" type="slidenum">
+              <a:rPr lang="en-GB" smtClean="0"/>
+              <a:t>2</a:t>
+            </a:fld>
+            <a:endParaRPr lang="en-GB"/>
           </a:p>
         </p:txBody>
       </p:sp>
@@ -17933,6 +18282,35 @@
           </a:xfrm>
         </p:spPr>
       </p:pic>
+      <p:sp>
+        <p:nvSpPr>
+          <p:cNvPr id="3" name="Slide Number Placeholder 2">
+            <a:extLst>
+              <a:ext uri="{FF2B5EF4-FFF2-40B4-BE49-F238E27FC236}">
+                <a16:creationId xmlns:a16="http://schemas.microsoft.com/office/drawing/2014/main" id="{95B9B0B1-B987-47E1-943B-B391C635A36C}"/>
+              </a:ext>
+            </a:extLst>
+          </p:cNvPr>
+          <p:cNvSpPr>
+            <a:spLocks noGrp="1"/>
+          </p:cNvSpPr>
+          <p:nvPr>
+            <p:ph type="sldNum" sz="quarter" idx="12"/>
+          </p:nvPr>
+        </p:nvSpPr>
+        <p:spPr/>
+        <p:txBody>
+          <a:bodyPr/>
+          <a:lstStyle/>
+          <a:p>
+            <a:fld id="{558F8992-8396-4A3F-A09F-D0B391125C2B}" type="slidenum">
+              <a:rPr lang="en-GB" smtClean="0"/>
+              <a:t>20</a:t>
+            </a:fld>
+            <a:endParaRPr lang="en-GB"/>
+          </a:p>
+        </p:txBody>
+      </p:sp>
     </p:spTree>
     <p:extLst>
       <p:ext uri="{BB962C8B-B14F-4D97-AF65-F5344CB8AC3E}">
@@ -18167,6 +18545,35 @@
               <a:rPr lang="en-GB" dirty="0"/>
               <a:t>(13 * 40) + (9 * 8) + 6 = 520 + 72 + 6 = 602 hours logged on Jira</a:t>
             </a:r>
+          </a:p>
+        </p:txBody>
+      </p:sp>
+      <p:sp>
+        <p:nvSpPr>
+          <p:cNvPr id="3" name="Slide Number Placeholder 2">
+            <a:extLst>
+              <a:ext uri="{FF2B5EF4-FFF2-40B4-BE49-F238E27FC236}">
+                <a16:creationId xmlns:a16="http://schemas.microsoft.com/office/drawing/2014/main" id="{23C4B5E9-18BB-4D33-B24C-D50E401FF524}"/>
+              </a:ext>
+            </a:extLst>
+          </p:cNvPr>
+          <p:cNvSpPr>
+            <a:spLocks noGrp="1"/>
+          </p:cNvSpPr>
+          <p:nvPr>
+            <p:ph type="sldNum" sz="quarter" idx="12"/>
+          </p:nvPr>
+        </p:nvSpPr>
+        <p:spPr/>
+        <p:txBody>
+          <a:bodyPr/>
+          <a:lstStyle/>
+          <a:p>
+            <a:fld id="{558F8992-8396-4A3F-A09F-D0B391125C2B}" type="slidenum">
+              <a:rPr lang="en-GB" smtClean="0"/>
+              <a:t>21</a:t>
+            </a:fld>
+            <a:endParaRPr lang="en-GB"/>
           </a:p>
         </p:txBody>
       </p:sp>
@@ -18514,6 +18921,35 @@
           </a:p>
         </p:txBody>
       </p:sp>
+      <p:sp>
+        <p:nvSpPr>
+          <p:cNvPr id="4" name="Slide Number Placeholder 3">
+            <a:extLst>
+              <a:ext uri="{FF2B5EF4-FFF2-40B4-BE49-F238E27FC236}">
+                <a16:creationId xmlns:a16="http://schemas.microsoft.com/office/drawing/2014/main" id="{5ADC57A8-366B-4097-B0A4-B6160455BDB5}"/>
+              </a:ext>
+            </a:extLst>
+          </p:cNvPr>
+          <p:cNvSpPr>
+            <a:spLocks noGrp="1"/>
+          </p:cNvSpPr>
+          <p:nvPr>
+            <p:ph type="sldNum" sz="quarter" idx="12"/>
+          </p:nvPr>
+        </p:nvSpPr>
+        <p:spPr/>
+        <p:txBody>
+          <a:bodyPr/>
+          <a:lstStyle/>
+          <a:p>
+            <a:fld id="{558F8992-8396-4A3F-A09F-D0B391125C2B}" type="slidenum">
+              <a:rPr lang="en-GB" smtClean="0"/>
+              <a:t>22</a:t>
+            </a:fld>
+            <a:endParaRPr lang="en-GB"/>
+          </a:p>
+        </p:txBody>
+      </p:sp>
     </p:spTree>
     <p:extLst>
       <p:ext uri="{BB962C8B-B14F-4D97-AF65-F5344CB8AC3E}">
@@ -18597,6 +19033,35 @@
               <a:rPr lang="en-GB" dirty="0"/>
               <a:t>Ask away!</a:t>
             </a:r>
+          </a:p>
+        </p:txBody>
+      </p:sp>
+      <p:sp>
+        <p:nvSpPr>
+          <p:cNvPr id="4" name="Slide Number Placeholder 3">
+            <a:extLst>
+              <a:ext uri="{FF2B5EF4-FFF2-40B4-BE49-F238E27FC236}">
+                <a16:creationId xmlns:a16="http://schemas.microsoft.com/office/drawing/2014/main" id="{3156D5E5-F3A3-44C6-8141-7B730B2E744F}"/>
+              </a:ext>
+            </a:extLst>
+          </p:cNvPr>
+          <p:cNvSpPr>
+            <a:spLocks noGrp="1"/>
+          </p:cNvSpPr>
+          <p:nvPr>
+            <p:ph type="sldNum" sz="quarter" idx="12"/>
+          </p:nvPr>
+        </p:nvSpPr>
+        <p:spPr/>
+        <p:txBody>
+          <a:bodyPr/>
+          <a:lstStyle/>
+          <a:p>
+            <a:fld id="{558F8992-8396-4A3F-A09F-D0B391125C2B}" type="slidenum">
+              <a:rPr lang="en-GB" smtClean="0"/>
+              <a:t>23</a:t>
+            </a:fld>
+            <a:endParaRPr lang="en-GB"/>
           </a:p>
         </p:txBody>
       </p:sp>
@@ -18863,6 +19328,35 @@
           </a:p>
         </p:txBody>
       </p:sp>
+      <p:sp>
+        <p:nvSpPr>
+          <p:cNvPr id="3" name="Slide Number Placeholder 2">
+            <a:extLst>
+              <a:ext uri="{FF2B5EF4-FFF2-40B4-BE49-F238E27FC236}">
+                <a16:creationId xmlns:a16="http://schemas.microsoft.com/office/drawing/2014/main" id="{7DE76D93-D592-4569-927A-E106B46C0704}"/>
+              </a:ext>
+            </a:extLst>
+          </p:cNvPr>
+          <p:cNvSpPr>
+            <a:spLocks noGrp="1"/>
+          </p:cNvSpPr>
+          <p:nvPr>
+            <p:ph type="sldNum" sz="quarter" idx="12"/>
+          </p:nvPr>
+        </p:nvSpPr>
+        <p:spPr/>
+        <p:txBody>
+          <a:bodyPr/>
+          <a:lstStyle/>
+          <a:p>
+            <a:fld id="{558F8992-8396-4A3F-A09F-D0B391125C2B}" type="slidenum">
+              <a:rPr lang="en-GB" smtClean="0"/>
+              <a:t>24</a:t>
+            </a:fld>
+            <a:endParaRPr lang="en-GB"/>
+          </a:p>
+        </p:txBody>
+      </p:sp>
     </p:spTree>
     <p:extLst>
       <p:ext uri="{BB962C8B-B14F-4D97-AF65-F5344CB8AC3E}">
@@ -19064,6 +19558,35 @@
               <a:rPr lang="en-GB" dirty="0"/>
               <a:t>Completely refactored that out, simply using event handling.</a:t>
             </a:r>
+          </a:p>
+        </p:txBody>
+      </p:sp>
+      <p:sp>
+        <p:nvSpPr>
+          <p:cNvPr id="7" name="Slide Number Placeholder 6">
+            <a:extLst>
+              <a:ext uri="{FF2B5EF4-FFF2-40B4-BE49-F238E27FC236}">
+                <a16:creationId xmlns:a16="http://schemas.microsoft.com/office/drawing/2014/main" id="{ABF90842-DE33-4BE5-AD67-07BE97DC3F4D}"/>
+              </a:ext>
+            </a:extLst>
+          </p:cNvPr>
+          <p:cNvSpPr>
+            <a:spLocks noGrp="1"/>
+          </p:cNvSpPr>
+          <p:nvPr>
+            <p:ph type="sldNum" sz="quarter" idx="12"/>
+          </p:nvPr>
+        </p:nvSpPr>
+        <p:spPr/>
+        <p:txBody>
+          <a:bodyPr/>
+          <a:lstStyle/>
+          <a:p>
+            <a:fld id="{558F8992-8396-4A3F-A09F-D0B391125C2B}" type="slidenum">
+              <a:rPr lang="en-GB" smtClean="0"/>
+              <a:t>25</a:t>
+            </a:fld>
+            <a:endParaRPr lang="en-GB"/>
           </a:p>
         </p:txBody>
       </p:sp>
@@ -19204,6 +19727,35 @@
           </a:p>
         </p:txBody>
       </p:sp>
+      <p:sp>
+        <p:nvSpPr>
+          <p:cNvPr id="4" name="Slide Number Placeholder 3">
+            <a:extLst>
+              <a:ext uri="{FF2B5EF4-FFF2-40B4-BE49-F238E27FC236}">
+                <a16:creationId xmlns:a16="http://schemas.microsoft.com/office/drawing/2014/main" id="{7BBAD719-2CBE-4DC7-A5B7-A91060987D59}"/>
+              </a:ext>
+            </a:extLst>
+          </p:cNvPr>
+          <p:cNvSpPr>
+            <a:spLocks noGrp="1"/>
+          </p:cNvSpPr>
+          <p:nvPr>
+            <p:ph type="sldNum" sz="quarter" idx="12"/>
+          </p:nvPr>
+        </p:nvSpPr>
+        <p:spPr/>
+        <p:txBody>
+          <a:bodyPr/>
+          <a:lstStyle/>
+          <a:p>
+            <a:fld id="{558F8992-8396-4A3F-A09F-D0B391125C2B}" type="slidenum">
+              <a:rPr lang="en-GB" smtClean="0"/>
+              <a:t>26</a:t>
+            </a:fld>
+            <a:endParaRPr lang="en-GB"/>
+          </a:p>
+        </p:txBody>
+      </p:sp>
     </p:spTree>
     <p:extLst>
       <p:ext uri="{BB962C8B-B14F-4D97-AF65-F5344CB8AC3E}">
@@ -19370,6 +19922,35 @@
           </a:graphicData>
         </a:graphic>
       </p:graphicFrame>
+      <p:sp>
+        <p:nvSpPr>
+          <p:cNvPr id="4" name="Slide Number Placeholder 3">
+            <a:extLst>
+              <a:ext uri="{FF2B5EF4-FFF2-40B4-BE49-F238E27FC236}">
+                <a16:creationId xmlns:a16="http://schemas.microsoft.com/office/drawing/2014/main" id="{E3B3B5E2-13AF-4505-B728-FB3AE120ED48}"/>
+              </a:ext>
+            </a:extLst>
+          </p:cNvPr>
+          <p:cNvSpPr>
+            <a:spLocks noGrp="1"/>
+          </p:cNvSpPr>
+          <p:nvPr>
+            <p:ph type="sldNum" sz="quarter" idx="12"/>
+          </p:nvPr>
+        </p:nvSpPr>
+        <p:spPr/>
+        <p:txBody>
+          <a:bodyPr/>
+          <a:lstStyle/>
+          <a:p>
+            <a:fld id="{558F8992-8396-4A3F-A09F-D0B391125C2B}" type="slidenum">
+              <a:rPr lang="en-GB" smtClean="0"/>
+              <a:t>3</a:t>
+            </a:fld>
+            <a:endParaRPr lang="en-GB"/>
+          </a:p>
+        </p:txBody>
+      </p:sp>
     </p:spTree>
     <p:extLst>
       <p:ext uri="{BB962C8B-B14F-4D97-AF65-F5344CB8AC3E}">
@@ -19833,6 +20414,35 @@
           </a:p>
         </p:txBody>
       </p:sp>
+      <p:sp>
+        <p:nvSpPr>
+          <p:cNvPr id="4" name="Slide Number Placeholder 3">
+            <a:extLst>
+              <a:ext uri="{FF2B5EF4-FFF2-40B4-BE49-F238E27FC236}">
+                <a16:creationId xmlns:a16="http://schemas.microsoft.com/office/drawing/2014/main" id="{59613284-1EFE-4056-A8D1-6FAC13C8E6C1}"/>
+              </a:ext>
+            </a:extLst>
+          </p:cNvPr>
+          <p:cNvSpPr>
+            <a:spLocks noGrp="1"/>
+          </p:cNvSpPr>
+          <p:nvPr>
+            <p:ph type="sldNum" sz="quarter" idx="12"/>
+          </p:nvPr>
+        </p:nvSpPr>
+        <p:spPr/>
+        <p:txBody>
+          <a:bodyPr/>
+          <a:lstStyle/>
+          <a:p>
+            <a:fld id="{558F8992-8396-4A3F-A09F-D0B391125C2B}" type="slidenum">
+              <a:rPr lang="en-GB" smtClean="0"/>
+              <a:t>4</a:t>
+            </a:fld>
+            <a:endParaRPr lang="en-GB"/>
+          </a:p>
+        </p:txBody>
+      </p:sp>
     </p:spTree>
     <p:extLst>
       <p:ext uri="{BB962C8B-B14F-4D97-AF65-F5344CB8AC3E}">
@@ -20236,6 +20846,35 @@
           </a:p>
           <a:p>
             <a:endParaRPr lang="en-GB" dirty="0"/>
+          </a:p>
+        </p:txBody>
+      </p:sp>
+      <p:sp>
+        <p:nvSpPr>
+          <p:cNvPr id="7" name="Slide Number Placeholder 6">
+            <a:extLst>
+              <a:ext uri="{FF2B5EF4-FFF2-40B4-BE49-F238E27FC236}">
+                <a16:creationId xmlns:a16="http://schemas.microsoft.com/office/drawing/2014/main" id="{10588F5E-F734-4027-8C8B-BFA5311231CC}"/>
+              </a:ext>
+            </a:extLst>
+          </p:cNvPr>
+          <p:cNvSpPr>
+            <a:spLocks noGrp="1"/>
+          </p:cNvSpPr>
+          <p:nvPr>
+            <p:ph type="sldNum" sz="quarter" idx="12"/>
+          </p:nvPr>
+        </p:nvSpPr>
+        <p:spPr/>
+        <p:txBody>
+          <a:bodyPr/>
+          <a:lstStyle/>
+          <a:p>
+            <a:fld id="{558F8992-8396-4A3F-A09F-D0B391125C2B}" type="slidenum">
+              <a:rPr lang="en-GB" smtClean="0"/>
+              <a:t>5</a:t>
+            </a:fld>
+            <a:endParaRPr lang="en-GB"/>
           </a:p>
         </p:txBody>
       </p:sp>
@@ -21017,6 +21656,35 @@
           </a:p>
         </p:txBody>
       </p:sp>
+      <p:sp>
+        <p:nvSpPr>
+          <p:cNvPr id="3" name="Slide Number Placeholder 2">
+            <a:extLst>
+              <a:ext uri="{FF2B5EF4-FFF2-40B4-BE49-F238E27FC236}">
+                <a16:creationId xmlns:a16="http://schemas.microsoft.com/office/drawing/2014/main" id="{C834BF6B-3A00-4B06-9A40-1D4691B30E58}"/>
+              </a:ext>
+            </a:extLst>
+          </p:cNvPr>
+          <p:cNvSpPr>
+            <a:spLocks noGrp="1"/>
+          </p:cNvSpPr>
+          <p:nvPr>
+            <p:ph type="sldNum" sz="quarter" idx="12"/>
+          </p:nvPr>
+        </p:nvSpPr>
+        <p:spPr/>
+        <p:txBody>
+          <a:bodyPr/>
+          <a:lstStyle/>
+          <a:p>
+            <a:fld id="{558F8992-8396-4A3F-A09F-D0B391125C2B}" type="slidenum">
+              <a:rPr lang="en-GB" smtClean="0"/>
+              <a:t>6</a:t>
+            </a:fld>
+            <a:endParaRPr lang="en-GB"/>
+          </a:p>
+        </p:txBody>
+      </p:sp>
     </p:spTree>
     <p:extLst>
       <p:ext uri="{BB962C8B-B14F-4D97-AF65-F5344CB8AC3E}">
@@ -21540,6 +22208,35 @@
               <a:rPr lang="en-GB" dirty="0"/>
               <a:t>Combining OH-HECC and HECC-UP into one utility</a:t>
             </a:r>
+          </a:p>
+        </p:txBody>
+      </p:sp>
+      <p:sp>
+        <p:nvSpPr>
+          <p:cNvPr id="4" name="Slide Number Placeholder 3">
+            <a:extLst>
+              <a:ext uri="{FF2B5EF4-FFF2-40B4-BE49-F238E27FC236}">
+                <a16:creationId xmlns:a16="http://schemas.microsoft.com/office/drawing/2014/main" id="{C5EF0C1D-EF58-40A2-B735-0420C68053CD}"/>
+              </a:ext>
+            </a:extLst>
+          </p:cNvPr>
+          <p:cNvSpPr>
+            <a:spLocks noGrp="1"/>
+          </p:cNvSpPr>
+          <p:nvPr>
+            <p:ph type="sldNum" sz="quarter" idx="12"/>
+          </p:nvPr>
+        </p:nvSpPr>
+        <p:spPr/>
+        <p:txBody>
+          <a:bodyPr/>
+          <a:lstStyle/>
+          <a:p>
+            <a:fld id="{558F8992-8396-4A3F-A09F-D0B391125C2B}" type="slidenum">
+              <a:rPr lang="en-GB" smtClean="0"/>
+              <a:t>7</a:t>
+            </a:fld>
+            <a:endParaRPr lang="en-GB"/>
           </a:p>
         </p:txBody>
       </p:sp>
@@ -22315,6 +23012,35 @@
               <a:rPr lang="en-GB" dirty="0"/>
               <a:t>Currently implemented via eval (ab)use.</a:t>
             </a:r>
+          </a:p>
+        </p:txBody>
+      </p:sp>
+      <p:sp>
+        <p:nvSpPr>
+          <p:cNvPr id="7" name="Slide Number Placeholder 6">
+            <a:extLst>
+              <a:ext uri="{FF2B5EF4-FFF2-40B4-BE49-F238E27FC236}">
+                <a16:creationId xmlns:a16="http://schemas.microsoft.com/office/drawing/2014/main" id="{6D6FA331-882A-41FA-9B6A-54596D1452B1}"/>
+              </a:ext>
+            </a:extLst>
+          </p:cNvPr>
+          <p:cNvSpPr>
+            <a:spLocks noGrp="1"/>
+          </p:cNvSpPr>
+          <p:nvPr>
+            <p:ph type="sldNum" sz="quarter" idx="12"/>
+          </p:nvPr>
+        </p:nvSpPr>
+        <p:spPr/>
+        <p:txBody>
+          <a:bodyPr/>
+          <a:lstStyle/>
+          <a:p>
+            <a:fld id="{558F8992-8396-4A3F-A09F-D0B391125C2B}" type="slidenum">
+              <a:rPr lang="en-GB" smtClean="0"/>
+              <a:t>8</a:t>
+            </a:fld>
+            <a:endParaRPr lang="en-GB"/>
           </a:p>
         </p:txBody>
       </p:sp>
@@ -23139,6 +23865,35 @@
               <a:rPr lang="en-GB" dirty="0"/>
               <a:t> in the GUI.</a:t>
             </a:r>
+          </a:p>
+        </p:txBody>
+      </p:sp>
+      <p:sp>
+        <p:nvSpPr>
+          <p:cNvPr id="7" name="Slide Number Placeholder 6">
+            <a:extLst>
+              <a:ext uri="{FF2B5EF4-FFF2-40B4-BE49-F238E27FC236}">
+                <a16:creationId xmlns:a16="http://schemas.microsoft.com/office/drawing/2014/main" id="{D8679E39-782A-42AE-BA65-F769984A5CA9}"/>
+              </a:ext>
+            </a:extLst>
+          </p:cNvPr>
+          <p:cNvSpPr>
+            <a:spLocks noGrp="1"/>
+          </p:cNvSpPr>
+          <p:nvPr>
+            <p:ph type="sldNum" sz="quarter" idx="12"/>
+          </p:nvPr>
+        </p:nvSpPr>
+        <p:spPr/>
+        <p:txBody>
+          <a:bodyPr/>
+          <a:lstStyle/>
+          <a:p>
+            <a:fld id="{558F8992-8396-4A3F-A09F-D0B391125C2B}" type="slidenum">
+              <a:rPr lang="en-GB" smtClean="0"/>
+              <a:t>9</a:t>
+            </a:fld>
+            <a:endParaRPr lang="en-GB"/>
           </a:p>
         </p:txBody>
       </p:sp>

</xml_diff>